<commit_message>
Added practice_integrations, integration_type and integration_vendors.  Modified patient search to display dialog box for chart id and use drchrono_patient api to get back patient data
</commit_message>
<xml_diff>
--- a/docs/deployment-documentation/ChangesForProd.pptx
+++ b/docs/deployment-documentation/ChangesForProd.pptx
@@ -6,7 +6,6 @@
   </p:sldMasterIdLst>
   <p:sldIdLst>
     <p:sldId id="256" r:id="rId2"/>
-    <p:sldId id="257" r:id="rId3"/>
   </p:sldIdLst>
   <p:sldSz cx="12192000" cy="6858000"/>
   <p:notesSz cx="6858000" cy="9144000"/>
@@ -3385,101 +3384,6 @@
 </p:sld>
 </file>
 
-<file path=ppt/slides/slide2.xml><?xml version="1.0" encoding="utf-8"?>
-<p:sld xmlns:a="http://schemas.openxmlformats.org/drawingml/2006/main" xmlns:r="http://schemas.openxmlformats.org/officeDocument/2006/relationships" xmlns:p="http://schemas.openxmlformats.org/presentationml/2006/main">
-  <p:cSld>
-    <p:spTree>
-      <p:nvGrpSpPr>
-        <p:cNvPr id="1" name=""/>
-        <p:cNvGrpSpPr/>
-        <p:nvPr/>
-      </p:nvGrpSpPr>
-      <p:grpSpPr>
-        <a:xfrm>
-          <a:off x="0" y="0"/>
-          <a:ext cx="0" cy="0"/>
-          <a:chOff x="0" y="0"/>
-          <a:chExt cx="0" cy="0"/>
-        </a:xfrm>
-      </p:grpSpPr>
-      <p:sp>
-        <p:nvSpPr>
-          <p:cNvPr id="2" name="Title 1">
-            <a:extLst>
-              <a:ext uri="{FF2B5EF4-FFF2-40B4-BE49-F238E27FC236}">
-                <a16:creationId xmlns:a16="http://schemas.microsoft.com/office/drawing/2014/main" id="{408CF222-8E17-3F94-975B-3BEF8FD86526}"/>
-              </a:ext>
-            </a:extLst>
-          </p:cNvPr>
-          <p:cNvSpPr>
-            <a:spLocks noGrp="1"/>
-          </p:cNvSpPr>
-          <p:nvPr>
-            <p:ph type="title"/>
-          </p:nvPr>
-        </p:nvSpPr>
-        <p:spPr>
-          <a:xfrm>
-            <a:off x="838200" y="365126"/>
-            <a:ext cx="10515600" cy="603704"/>
-          </a:xfrm>
-        </p:spPr>
-        <p:txBody>
-          <a:bodyPr>
-            <a:normAutofit/>
-          </a:bodyPr>
-          <a:lstStyle/>
-          <a:p>
-            <a:r>
-              <a:rPr lang="en-US" sz="2000" dirty="0"/>
-              <a:t>Lambda Layers for data models and database operational code.</a:t>
-            </a:r>
-          </a:p>
-        </p:txBody>
-      </p:sp>
-      <p:pic>
-        <p:nvPicPr>
-          <p:cNvPr id="3" name="Picture 2">
-            <a:extLst>
-              <a:ext uri="{FF2B5EF4-FFF2-40B4-BE49-F238E27FC236}">
-                <a16:creationId xmlns:a16="http://schemas.microsoft.com/office/drawing/2014/main" id="{AF67A37C-A7F9-76DE-C6E3-C12FF1797235}"/>
-              </a:ext>
-            </a:extLst>
-          </p:cNvPr>
-          <p:cNvPicPr>
-            <a:picLocks noChangeAspect="1"/>
-          </p:cNvPicPr>
-          <p:nvPr/>
-        </p:nvPicPr>
-        <p:blipFill>
-          <a:blip r:embed="rId2"/>
-          <a:stretch>
-            <a:fillRect/>
-          </a:stretch>
-        </p:blipFill>
-        <p:spPr>
-          <a:xfrm>
-            <a:off x="2789650" y="1311785"/>
-            <a:ext cx="6612699" cy="5317254"/>
-          </a:xfrm>
-          <a:prstGeom prst="rect">
-            <a:avLst/>
-          </a:prstGeom>
-        </p:spPr>
-      </p:pic>
-    </p:spTree>
-    <p:extLst>
-      <p:ext uri="{BB962C8B-B14F-4D97-AF65-F5344CB8AC3E}">
-        <p14:creationId xmlns:p14="http://schemas.microsoft.com/office/powerpoint/2010/main" val="2477377404"/>
-      </p:ext>
-    </p:extLst>
-  </p:cSld>
-  <p:clrMapOvr>
-    <a:masterClrMapping/>
-  </p:clrMapOvr>
-</p:sld>
-</file>
-
 <file path=ppt/theme/theme1.xml><?xml version="1.0" encoding="utf-8"?>
 <a:theme xmlns:a="http://schemas.openxmlformats.org/drawingml/2006/main" name="Office Theme">
   <a:themeElements>

</xml_diff>